<commit_message>
Updated slides a little
</commit_message>
<xml_diff>
--- a/docs/ECE 540 - Final Project Presentation.pptx
+++ b/docs/ECE 540 - Final Project Presentation.pptx
@@ -12,10 +12,10 @@
     <p:sldId id="258" r:id="rId3"/>
     <p:sldId id="260" r:id="rId4"/>
     <p:sldId id="270" r:id="rId5"/>
-    <p:sldId id="269" r:id="rId6"/>
-    <p:sldId id="271" r:id="rId7"/>
-    <p:sldId id="259" r:id="rId8"/>
-    <p:sldId id="261" r:id="rId9"/>
+    <p:sldId id="259" r:id="rId6"/>
+    <p:sldId id="261" r:id="rId7"/>
+    <p:sldId id="269" r:id="rId8"/>
+    <p:sldId id="271" r:id="rId9"/>
     <p:sldId id="272" r:id="rId10"/>
     <p:sldId id="262" r:id="rId11"/>
     <p:sldId id="274" r:id="rId12"/>
@@ -1139,6 +1139,13 @@
         </dgm:presLayoutVars>
       </dgm:prSet>
       <dgm:spPr/>
+      <dgm:t>
+        <a:bodyPr/>
+        <a:lstStyle/>
+        <a:p>
+          <a:endParaRPr lang="en-US"/>
+        </a:p>
+      </dgm:t>
     </dgm:pt>
     <dgm:pt modelId="{630CBFD1-A71B-4155-A8DF-24F76EB29C9A}" type="pres">
       <dgm:prSet presAssocID="{8343FE12-0E1C-460E-B5A4-1643B75AA837}" presName="parTxOnlySpace" presStyleCnt="0"/>
@@ -1153,6 +1160,13 @@
         </dgm:presLayoutVars>
       </dgm:prSet>
       <dgm:spPr/>
+      <dgm:t>
+        <a:bodyPr/>
+        <a:lstStyle/>
+        <a:p>
+          <a:endParaRPr lang="en-US"/>
+        </a:p>
+      </dgm:t>
     </dgm:pt>
     <dgm:pt modelId="{3C728079-D46C-4B77-BC4D-CF59926178DD}" type="pres">
       <dgm:prSet presAssocID="{F02E2933-0FF7-4F91-B939-C2CDF04F7F28}" presName="parTxOnlySpace" presStyleCnt="0"/>
@@ -1167,6 +1181,13 @@
         </dgm:presLayoutVars>
       </dgm:prSet>
       <dgm:spPr/>
+      <dgm:t>
+        <a:bodyPr/>
+        <a:lstStyle/>
+        <a:p>
+          <a:endParaRPr lang="en-US"/>
+        </a:p>
+      </dgm:t>
     </dgm:pt>
   </dgm:ptLst>
   <dgm:cxnLst>
@@ -2997,7 +3018,7 @@
           <a:p>
             <a:fld id="{AEECA8AE-499E-46EC-8DF8-76983C236D76}" type="datetimeFigureOut">
               <a:rPr lang="en-US" smtClean="0"/>
-              <a:t>12/7/2015</a:t>
+              <a:t>12/8/2015</a:t>
             </a:fld>
             <a:endParaRPr lang="en-US"/>
           </a:p>
@@ -3427,7 +3448,7 @@
           <a:p>
             <a:fld id="{C48BF8F1-6149-4DE2-80B5-341F6C12AF60}" type="slidenum">
               <a:rPr lang="en-US" smtClean="0"/>
-              <a:t>8</a:t>
+              <a:t>6</a:t>
             </a:fld>
             <a:endParaRPr lang="en-US"/>
           </a:p>
@@ -3632,7 +3653,7 @@
           <a:p>
             <a:fld id="{AB42214C-6A6F-4F8F-A6C5-5386887DD751}" type="datetimeFigureOut">
               <a:rPr lang="en-US" smtClean="0"/>
-              <a:t>12/7/2015</a:t>
+              <a:t>12/8/2015</a:t>
             </a:fld>
             <a:endParaRPr lang="en-US"/>
           </a:p>
@@ -3907,7 +3928,7 @@
           <a:p>
             <a:fld id="{AB42214C-6A6F-4F8F-A6C5-5386887DD751}" type="datetimeFigureOut">
               <a:rPr lang="en-US" smtClean="0"/>
-              <a:t>12/7/2015</a:t>
+              <a:t>12/8/2015</a:t>
             </a:fld>
             <a:endParaRPr lang="en-US"/>
           </a:p>
@@ -4101,7 +4122,7 @@
           <a:p>
             <a:fld id="{AB42214C-6A6F-4F8F-A6C5-5386887DD751}" type="datetimeFigureOut">
               <a:rPr lang="en-US" smtClean="0"/>
-              <a:t>12/7/2015</a:t>
+              <a:t>12/8/2015</a:t>
             </a:fld>
             <a:endParaRPr lang="en-US"/>
           </a:p>
@@ -4374,7 +4395,7 @@
           <a:p>
             <a:fld id="{AB42214C-6A6F-4F8F-A6C5-5386887DD751}" type="datetimeFigureOut">
               <a:rPr lang="en-US" smtClean="0"/>
-              <a:t>12/7/2015</a:t>
+              <a:t>12/8/2015</a:t>
             </a:fld>
             <a:endParaRPr lang="en-US"/>
           </a:p>
@@ -4715,7 +4736,7 @@
           <a:p>
             <a:fld id="{AB42214C-6A6F-4F8F-A6C5-5386887DD751}" type="datetimeFigureOut">
               <a:rPr lang="en-US" smtClean="0"/>
-              <a:t>12/7/2015</a:t>
+              <a:t>12/8/2015</a:t>
             </a:fld>
             <a:endParaRPr lang="en-US"/>
           </a:p>
@@ -5338,7 +5359,7 @@
           <a:p>
             <a:fld id="{AB42214C-6A6F-4F8F-A6C5-5386887DD751}" type="datetimeFigureOut">
               <a:rPr lang="en-US" smtClean="0"/>
-              <a:t>12/7/2015</a:t>
+              <a:t>12/8/2015</a:t>
             </a:fld>
             <a:endParaRPr lang="en-US"/>
           </a:p>
@@ -6198,7 +6219,7 @@
           <a:p>
             <a:fld id="{AB42214C-6A6F-4F8F-A6C5-5386887DD751}" type="datetimeFigureOut">
               <a:rPr lang="en-US" smtClean="0"/>
-              <a:t>12/7/2015</a:t>
+              <a:t>12/8/2015</a:t>
             </a:fld>
             <a:endParaRPr lang="en-US"/>
           </a:p>
@@ -6368,7 +6389,7 @@
           <a:p>
             <a:fld id="{AB42214C-6A6F-4F8F-A6C5-5386887DD751}" type="datetimeFigureOut">
               <a:rPr lang="en-US" smtClean="0"/>
-              <a:t>12/7/2015</a:t>
+              <a:t>12/8/2015</a:t>
             </a:fld>
             <a:endParaRPr lang="en-US"/>
           </a:p>
@@ -6548,7 +6569,7 @@
           <a:p>
             <a:fld id="{AB42214C-6A6F-4F8F-A6C5-5386887DD751}" type="datetimeFigureOut">
               <a:rPr lang="en-US" smtClean="0"/>
-              <a:t>12/7/2015</a:t>
+              <a:t>12/8/2015</a:t>
             </a:fld>
             <a:endParaRPr lang="en-US"/>
           </a:p>
@@ -6718,7 +6739,7 @@
           <a:p>
             <a:fld id="{AB42214C-6A6F-4F8F-A6C5-5386887DD751}" type="datetimeFigureOut">
               <a:rPr lang="en-US" smtClean="0"/>
-              <a:t>12/7/2015</a:t>
+              <a:t>12/8/2015</a:t>
             </a:fld>
             <a:endParaRPr lang="en-US"/>
           </a:p>
@@ -6965,7 +6986,7 @@
           <a:p>
             <a:fld id="{AB42214C-6A6F-4F8F-A6C5-5386887DD751}" type="datetimeFigureOut">
               <a:rPr lang="en-US" smtClean="0"/>
-              <a:t>12/7/2015</a:t>
+              <a:t>12/8/2015</a:t>
             </a:fld>
             <a:endParaRPr lang="en-US"/>
           </a:p>
@@ -7257,7 +7278,7 @@
           <a:p>
             <a:fld id="{AB42214C-6A6F-4F8F-A6C5-5386887DD751}" type="datetimeFigureOut">
               <a:rPr lang="en-US" smtClean="0"/>
-              <a:t>12/7/2015</a:t>
+              <a:t>12/8/2015</a:t>
             </a:fld>
             <a:endParaRPr lang="en-US"/>
           </a:p>
@@ -7701,7 +7722,7 @@
           <a:p>
             <a:fld id="{AB42214C-6A6F-4F8F-A6C5-5386887DD751}" type="datetimeFigureOut">
               <a:rPr lang="en-US" smtClean="0"/>
-              <a:t>12/7/2015</a:t>
+              <a:t>12/8/2015</a:t>
             </a:fld>
             <a:endParaRPr lang="en-US"/>
           </a:p>
@@ -7819,7 +7840,7 @@
           <a:p>
             <a:fld id="{AB42214C-6A6F-4F8F-A6C5-5386887DD751}" type="datetimeFigureOut">
               <a:rPr lang="en-US" smtClean="0"/>
-              <a:t>12/7/2015</a:t>
+              <a:t>12/8/2015</a:t>
             </a:fld>
             <a:endParaRPr lang="en-US"/>
           </a:p>
@@ -7914,7 +7935,7 @@
           <a:p>
             <a:fld id="{AB42214C-6A6F-4F8F-A6C5-5386887DD751}" type="datetimeFigureOut">
               <a:rPr lang="en-US" smtClean="0"/>
-              <a:t>12/7/2015</a:t>
+              <a:t>12/8/2015</a:t>
             </a:fld>
             <a:endParaRPr lang="en-US"/>
           </a:p>
@@ -8193,7 +8214,7 @@
           <a:p>
             <a:fld id="{AB42214C-6A6F-4F8F-A6C5-5386887DD751}" type="datetimeFigureOut">
               <a:rPr lang="en-US" smtClean="0"/>
-              <a:t>12/7/2015</a:t>
+              <a:t>12/8/2015</a:t>
             </a:fld>
             <a:endParaRPr lang="en-US"/>
           </a:p>
@@ -8468,7 +8489,7 @@
           <a:p>
             <a:fld id="{AB42214C-6A6F-4F8F-A6C5-5386887DD751}" type="datetimeFigureOut">
               <a:rPr lang="en-US" smtClean="0"/>
-              <a:t>12/7/2015</a:t>
+              <a:t>12/8/2015</a:t>
             </a:fld>
             <a:endParaRPr lang="en-US"/>
           </a:p>
@@ -8897,7 +8918,7 @@
           <a:p>
             <a:fld id="{AB42214C-6A6F-4F8F-A6C5-5386887DD751}" type="datetimeFigureOut">
               <a:rPr lang="en-US" smtClean="0"/>
-              <a:t>12/7/2015</a:t>
+              <a:t>12/8/2015</a:t>
             </a:fld>
             <a:endParaRPr lang="en-US"/>
           </a:p>
@@ -9783,7 +9804,7 @@
             </a:r>
             <a:r>
               <a:rPr lang="en-US" sz="2000" dirty="0" err="1" smtClean="0"/>
-              <a:t>Vivao</a:t>
+              <a:t>Vivado</a:t>
             </a:r>
             <a:endParaRPr lang="en-US" sz="2000" dirty="0" smtClean="0"/>
           </a:p>
@@ -9808,7 +9829,11 @@
           <a:p>
             <a:r>
               <a:rPr lang="en-US" sz="2400" dirty="0" smtClean="0"/>
-              <a:t>Need to compare generated HDL against original model</a:t>
+              <a:t>Issues: Need </a:t>
+            </a:r>
+            <a:r>
+              <a:rPr lang="en-US" sz="2400" dirty="0" smtClean="0"/>
+              <a:t>to compare generated HDL against original model</a:t>
             </a:r>
           </a:p>
           <a:p>
@@ -9829,8 +9854,20 @@
             <a:pPr lvl="1"/>
             <a:r>
               <a:rPr lang="en-US" sz="2000" dirty="0" smtClean="0"/>
-              <a:t>Simulation speed (co-simulate on board possible)</a:t>
-            </a:r>
+              <a:t>Simulation speed (co-simulate on board possible</a:t>
+            </a:r>
+            <a:r>
+              <a:rPr lang="en-US" sz="2000" dirty="0" smtClean="0"/>
+              <a:t>)</a:t>
+            </a:r>
+          </a:p>
+          <a:p>
+            <a:pPr lvl="1"/>
+            <a:r>
+              <a:rPr lang="en-US" sz="2000" dirty="0" smtClean="0"/>
+              <a:t>Just getting familiar with workflow is hard</a:t>
+            </a:r>
+            <a:endParaRPr lang="en-US" sz="2000" dirty="0" smtClean="0"/>
           </a:p>
         </p:txBody>
       </p:sp>
@@ -9912,7 +9949,12 @@
             <p:ph type="body" idx="1"/>
           </p:nvPr>
         </p:nvSpPr>
-        <p:spPr/>
+        <p:spPr>
+          <a:xfrm>
+            <a:off x="954209" y="1979540"/>
+            <a:ext cx="4396338" cy="576262"/>
+          </a:xfrm>
+        </p:spPr>
         <p:txBody>
           <a:bodyPr/>
           <a:lstStyle/>
@@ -9971,8 +10013,8 @@
         </p:nvSpPr>
         <p:spPr>
           <a:xfrm>
-            <a:off x="5756095" y="2289969"/>
-            <a:ext cx="4396339" cy="576262"/>
+            <a:off x="6171501" y="2393963"/>
+            <a:ext cx="3362325" cy="576262"/>
           </a:xfrm>
         </p:spPr>
         <p:txBody>
@@ -10131,7 +10173,15 @@
             </a:pPr>
             <a:r>
               <a:rPr lang="en-US" sz="2600" dirty="0" smtClean="0"/>
-              <a:t>Store FFT samples in a block RAM</a:t>
+              <a:t>Store FFT </a:t>
+            </a:r>
+            <a:r>
+              <a:rPr lang="en-US" sz="2600" dirty="0" smtClean="0"/>
+              <a:t>output in </a:t>
+            </a:r>
+            <a:r>
+              <a:rPr lang="en-US" sz="2600" dirty="0" smtClean="0"/>
+              <a:t>a block RAM</a:t>
             </a:r>
           </a:p>
           <a:p>
@@ -10159,7 +10209,6 @@
               <a:rPr lang="en-US" sz="2600" dirty="0" smtClean="0"/>
               <a:t>Based on vertical position and power, determine whether to draw or not</a:t>
             </a:r>
-            <a:endParaRPr lang="en-US" sz="2600" dirty="0" smtClean="0"/>
           </a:p>
         </p:txBody>
       </p:sp>
@@ -10553,11 +10602,14 @@
         </p:nvSpPr>
         <p:spPr>
           <a:xfrm rot="16200000">
-            <a:off x="6291477" y="4678977"/>
-            <a:ext cx="616907" cy="333147"/>
+            <a:off x="6372307" y="4678976"/>
+            <a:ext cx="455250" cy="333147"/>
           </a:xfrm>
           <a:prstGeom prst="leftRightArrow">
-            <a:avLst/>
+            <a:avLst>
+              <a:gd name="adj1" fmla="val 50000"/>
+              <a:gd name="adj2" fmla="val 45904"/>
+            </a:avLst>
           </a:prstGeom>
           <a:ln>
             <a:solidFill>
@@ -10604,7 +10656,11 @@
             <a:ext cx="1025842" cy="1158525"/>
           </a:xfrm>
           <a:prstGeom prst="bentUpArrow">
-            <a:avLst/>
+            <a:avLst>
+              <a:gd name="adj1" fmla="val 19678"/>
+              <a:gd name="adj2" fmla="val 25000"/>
+              <a:gd name="adj3" fmla="val 25000"/>
+            </a:avLst>
           </a:prstGeom>
           <a:ln>
             <a:solidFill>
@@ -10739,7 +10795,6 @@
               <a:rPr lang="en-US" sz="2400" dirty="0" smtClean="0"/>
               <a:t>Provides PDM output of sample</a:t>
             </a:r>
-            <a:endParaRPr lang="en-US" sz="2400" dirty="0" smtClean="0"/>
           </a:p>
           <a:p>
             <a:pPr marL="342900" indent="-342900" algn="l">
@@ -10766,7 +10821,7 @@
         </p:blipFill>
         <p:spPr>
           <a:xfrm>
-            <a:off x="2114176" y="3283324"/>
+            <a:off x="2260304" y="3283324"/>
             <a:ext cx="7455491" cy="2286000"/>
           </a:xfrm>
           <a:prstGeom prst="rect">
@@ -10891,6 +10946,14 @@
               <a:lumOff val="80000"/>
             </a:schemeClr>
           </a:solidFill>
+          <a:ln w="38100">
+            <a:solidFill>
+              <a:schemeClr val="bg2">
+                <a:lumMod val="60000"/>
+                <a:lumOff val="40000"/>
+              </a:schemeClr>
+            </a:solidFill>
+          </a:ln>
         </p:spPr>
         <p:style>
           <a:lnRef idx="2">
@@ -10943,11 +11006,7 @@
             </a:r>
             <a:r>
               <a:rPr lang="en-US" sz="4800" dirty="0" smtClean="0"/>
-              <a:t>: main </a:t>
-            </a:r>
-            <a:r>
-              <a:rPr lang="en-US" sz="4800" dirty="0" smtClean="0"/>
-              <a:t>I/O</a:t>
+              <a:t>: main I/O</a:t>
             </a:r>
             <a:endParaRPr lang="en-US" sz="4800" dirty="0"/>
           </a:p>
@@ -11536,649 +11595,6 @@
       </p:grpSpPr>
       <p:sp>
         <p:nvSpPr>
-          <p:cNvPr id="6" name="Rectangle 5"/>
-          <p:cNvSpPr/>
-          <p:nvPr/>
-        </p:nvSpPr>
-        <p:spPr>
-          <a:xfrm>
-            <a:off x="2483893" y="2156346"/>
-            <a:ext cx="6373504" cy="3998794"/>
-          </a:xfrm>
-          <a:prstGeom prst="rect">
-            <a:avLst/>
-          </a:prstGeom>
-          <a:solidFill>
-            <a:schemeClr val="bg1">
-              <a:lumMod val="75000"/>
-              <a:lumOff val="25000"/>
-            </a:schemeClr>
-          </a:solidFill>
-          <a:ln w="57150">
-            <a:solidFill>
-              <a:schemeClr val="tx1">
-                <a:lumMod val="95000"/>
-              </a:schemeClr>
-            </a:solidFill>
-          </a:ln>
-        </p:spPr>
-        <p:style>
-          <a:lnRef idx="2">
-            <a:schemeClr val="accent1">
-              <a:shade val="50000"/>
-            </a:schemeClr>
-          </a:lnRef>
-          <a:fillRef idx="1">
-            <a:schemeClr val="accent1"/>
-          </a:fillRef>
-          <a:effectRef idx="0">
-            <a:schemeClr val="accent1"/>
-          </a:effectRef>
-          <a:fontRef idx="minor">
-            <a:schemeClr val="lt1"/>
-          </a:fontRef>
-        </p:style>
-        <p:txBody>
-          <a:bodyPr rtlCol="0" anchor="ctr"/>
-          <a:lstStyle/>
-          <a:p>
-            <a:pPr algn="ctr"/>
-            <a:endParaRPr lang="en-US"/>
-          </a:p>
-        </p:txBody>
-      </p:sp>
-      <p:sp>
-        <p:nvSpPr>
-          <p:cNvPr id="2" name="Title 1"/>
-          <p:cNvSpPr>
-            <a:spLocks noGrp="1"/>
-          </p:cNvSpPr>
-          <p:nvPr>
-            <p:ph type="title"/>
-          </p:nvPr>
-        </p:nvSpPr>
-        <p:spPr/>
-        <p:txBody>
-          <a:bodyPr/>
-          <a:lstStyle/>
-          <a:p>
-            <a:r>
-              <a:rPr lang="en-US" sz="4800" dirty="0" err="1" smtClean="0"/>
-              <a:t>pdm_filter</a:t>
-            </a:r>
-            <a:r>
-              <a:rPr lang="en-US" sz="4800" dirty="0" smtClean="0"/>
-              <a:t>: main </a:t>
-            </a:r>
-            <a:r>
-              <a:rPr lang="en-US" sz="4800" dirty="0" smtClean="0"/>
-              <a:t>I/O</a:t>
-            </a:r>
-            <a:endParaRPr lang="en-US" sz="4800" dirty="0"/>
-          </a:p>
-        </p:txBody>
-      </p:sp>
-      <p:sp>
-        <p:nvSpPr>
-          <p:cNvPr id="7" name="TextBox 6"/>
-          <p:cNvSpPr txBox="1"/>
-          <p:nvPr/>
-        </p:nvSpPr>
-        <p:spPr>
-          <a:xfrm>
-            <a:off x="2518012" y="2462999"/>
-            <a:ext cx="846161" cy="369332"/>
-          </a:xfrm>
-          <a:prstGeom prst="rect">
-            <a:avLst/>
-          </a:prstGeom>
-          <a:noFill/>
-        </p:spPr>
-        <p:txBody>
-          <a:bodyPr wrap="square" rtlCol="0">
-            <a:spAutoFit/>
-          </a:bodyPr>
-          <a:lstStyle/>
-          <a:p>
-            <a:r>
-              <a:rPr lang="en-US" dirty="0" smtClean="0"/>
-              <a:t>.</a:t>
-            </a:r>
-            <a:r>
-              <a:rPr lang="en-US" dirty="0" err="1" smtClean="0"/>
-              <a:t>clk_i</a:t>
-            </a:r>
-            <a:endParaRPr lang="en-US" dirty="0"/>
-          </a:p>
-        </p:txBody>
-      </p:sp>
-      <p:sp>
-        <p:nvSpPr>
-          <p:cNvPr id="8" name="TextBox 7"/>
-          <p:cNvSpPr txBox="1"/>
-          <p:nvPr/>
-        </p:nvSpPr>
-        <p:spPr>
-          <a:xfrm>
-            <a:off x="2518011" y="2833175"/>
-            <a:ext cx="2006222" cy="369332"/>
-          </a:xfrm>
-          <a:prstGeom prst="rect">
-            <a:avLst/>
-          </a:prstGeom>
-          <a:noFill/>
-        </p:spPr>
-        <p:txBody>
-          <a:bodyPr wrap="square" rtlCol="0">
-            <a:spAutoFit/>
-          </a:bodyPr>
-          <a:lstStyle/>
-          <a:p>
-            <a:r>
-              <a:rPr lang="en-US" dirty="0" smtClean="0"/>
-              <a:t>.clk_6_144MHz</a:t>
-            </a:r>
-            <a:endParaRPr lang="en-US" dirty="0"/>
-          </a:p>
-        </p:txBody>
-      </p:sp>
-      <p:sp>
-        <p:nvSpPr>
-          <p:cNvPr id="9" name="TextBox 8"/>
-          <p:cNvSpPr txBox="1"/>
-          <p:nvPr/>
-        </p:nvSpPr>
-        <p:spPr>
-          <a:xfrm>
-            <a:off x="2518011" y="3135429"/>
-            <a:ext cx="2006222" cy="369332"/>
-          </a:xfrm>
-          <a:prstGeom prst="rect">
-            <a:avLst/>
-          </a:prstGeom>
-          <a:noFill/>
-        </p:spPr>
-        <p:txBody>
-          <a:bodyPr wrap="square" rtlCol="0">
-            <a:spAutoFit/>
-          </a:bodyPr>
-          <a:lstStyle/>
-          <a:p>
-            <a:r>
-              <a:rPr lang="en-US" dirty="0" smtClean="0"/>
-              <a:t>.</a:t>
-            </a:r>
-            <a:r>
-              <a:rPr lang="en-US" dirty="0" err="1" smtClean="0"/>
-              <a:t>pdm_data_i</a:t>
-            </a:r>
-            <a:endParaRPr lang="en-US" dirty="0"/>
-          </a:p>
-        </p:txBody>
-      </p:sp>
-      <p:sp>
-        <p:nvSpPr>
-          <p:cNvPr id="10" name="TextBox 9"/>
-          <p:cNvSpPr txBox="1"/>
-          <p:nvPr/>
-        </p:nvSpPr>
-        <p:spPr>
-          <a:xfrm>
-            <a:off x="6564574" y="2462999"/>
-            <a:ext cx="2156346" cy="369332"/>
-          </a:xfrm>
-          <a:prstGeom prst="rect">
-            <a:avLst/>
-          </a:prstGeom>
-          <a:noFill/>
-        </p:spPr>
-        <p:txBody>
-          <a:bodyPr wrap="square" rtlCol="0">
-            <a:spAutoFit/>
-          </a:bodyPr>
-          <a:lstStyle/>
-          <a:p>
-            <a:pPr algn="r"/>
-            <a:r>
-              <a:rPr lang="en-US" dirty="0" smtClean="0"/>
-              <a:t>.</a:t>
-            </a:r>
-            <a:r>
-              <a:rPr lang="en-US" dirty="0" err="1" smtClean="0"/>
-              <a:t>pdm_clk_o</a:t>
-            </a:r>
-            <a:endParaRPr lang="en-US" dirty="0"/>
-          </a:p>
-        </p:txBody>
-      </p:sp>
-      <p:sp>
-        <p:nvSpPr>
-          <p:cNvPr id="11" name="TextBox 10"/>
-          <p:cNvSpPr txBox="1"/>
-          <p:nvPr/>
-        </p:nvSpPr>
-        <p:spPr>
-          <a:xfrm>
-            <a:off x="6564573" y="2851117"/>
-            <a:ext cx="2156346" cy="369332"/>
-          </a:xfrm>
-          <a:prstGeom prst="rect">
-            <a:avLst/>
-          </a:prstGeom>
-          <a:noFill/>
-        </p:spPr>
-        <p:txBody>
-          <a:bodyPr wrap="square" rtlCol="0">
-            <a:spAutoFit/>
-          </a:bodyPr>
-          <a:lstStyle/>
-          <a:p>
-            <a:pPr algn="r"/>
-            <a:r>
-              <a:rPr lang="en-US" dirty="0" smtClean="0"/>
-              <a:t>.</a:t>
-            </a:r>
-            <a:r>
-              <a:rPr lang="en-US" dirty="0" err="1" smtClean="0"/>
-              <a:t>fs_o</a:t>
-            </a:r>
-            <a:endParaRPr lang="en-US" dirty="0"/>
-          </a:p>
-        </p:txBody>
-      </p:sp>
-      <p:sp>
-        <p:nvSpPr>
-          <p:cNvPr id="12" name="TextBox 11"/>
-          <p:cNvSpPr txBox="1"/>
-          <p:nvPr/>
-        </p:nvSpPr>
-        <p:spPr>
-          <a:xfrm>
-            <a:off x="6564574" y="3177216"/>
-            <a:ext cx="2156346" cy="369332"/>
-          </a:xfrm>
-          <a:prstGeom prst="rect">
-            <a:avLst/>
-          </a:prstGeom>
-          <a:noFill/>
-        </p:spPr>
-        <p:txBody>
-          <a:bodyPr wrap="square" rtlCol="0">
-            <a:spAutoFit/>
-          </a:bodyPr>
-          <a:lstStyle/>
-          <a:p>
-            <a:pPr algn="r"/>
-            <a:r>
-              <a:rPr lang="en-US" dirty="0" smtClean="0"/>
-              <a:t>.</a:t>
-            </a:r>
-            <a:r>
-              <a:rPr lang="en-US" dirty="0" err="1" smtClean="0"/>
-              <a:t>data_o</a:t>
-            </a:r>
-            <a:endParaRPr lang="en-US" dirty="0"/>
-          </a:p>
-        </p:txBody>
-      </p:sp>
-      <p:cxnSp>
-        <p:nvCxnSpPr>
-          <p:cNvPr id="19" name="Straight Connector 18"/>
-          <p:cNvCxnSpPr/>
-          <p:nvPr/>
-        </p:nvCxnSpPr>
-        <p:spPr>
-          <a:xfrm flipH="1">
-            <a:off x="1105468" y="2647666"/>
-            <a:ext cx="1351129" cy="0"/>
-          </a:xfrm>
-          <a:prstGeom prst="line">
-            <a:avLst/>
-          </a:prstGeom>
-          <a:ln w="57150">
-            <a:solidFill>
-              <a:schemeClr val="tx1">
-                <a:lumMod val="95000"/>
-              </a:schemeClr>
-            </a:solidFill>
-          </a:ln>
-        </p:spPr>
-        <p:style>
-          <a:lnRef idx="1">
-            <a:schemeClr val="accent1"/>
-          </a:lnRef>
-          <a:fillRef idx="0">
-            <a:schemeClr val="accent1"/>
-          </a:fillRef>
-          <a:effectRef idx="0">
-            <a:schemeClr val="accent1"/>
-          </a:effectRef>
-          <a:fontRef idx="minor">
-            <a:schemeClr val="tx1"/>
-          </a:fontRef>
-        </p:style>
-      </p:cxnSp>
-      <p:cxnSp>
-        <p:nvCxnSpPr>
-          <p:cNvPr id="20" name="Straight Connector 19"/>
-          <p:cNvCxnSpPr/>
-          <p:nvPr/>
-        </p:nvCxnSpPr>
-        <p:spPr>
-          <a:xfrm flipH="1">
-            <a:off x="1107742" y="3032081"/>
-            <a:ext cx="1351129" cy="0"/>
-          </a:xfrm>
-          <a:prstGeom prst="line">
-            <a:avLst/>
-          </a:prstGeom>
-          <a:ln w="57150">
-            <a:solidFill>
-              <a:schemeClr val="tx1">
-                <a:lumMod val="95000"/>
-              </a:schemeClr>
-            </a:solidFill>
-          </a:ln>
-        </p:spPr>
-        <p:style>
-          <a:lnRef idx="1">
-            <a:schemeClr val="accent1"/>
-          </a:lnRef>
-          <a:fillRef idx="0">
-            <a:schemeClr val="accent1"/>
-          </a:fillRef>
-          <a:effectRef idx="0">
-            <a:schemeClr val="accent1"/>
-          </a:effectRef>
-          <a:fontRef idx="minor">
-            <a:schemeClr val="tx1"/>
-          </a:fontRef>
-        </p:style>
-      </p:cxnSp>
-      <p:cxnSp>
-        <p:nvCxnSpPr>
-          <p:cNvPr id="21" name="Straight Connector 20"/>
-          <p:cNvCxnSpPr/>
-          <p:nvPr/>
-        </p:nvCxnSpPr>
-        <p:spPr>
-          <a:xfrm flipH="1">
-            <a:off x="1105468" y="3372835"/>
-            <a:ext cx="1351129" cy="0"/>
-          </a:xfrm>
-          <a:prstGeom prst="line">
-            <a:avLst/>
-          </a:prstGeom>
-          <a:ln w="57150">
-            <a:solidFill>
-              <a:schemeClr val="tx1">
-                <a:lumMod val="95000"/>
-              </a:schemeClr>
-            </a:solidFill>
-          </a:ln>
-        </p:spPr>
-        <p:style>
-          <a:lnRef idx="1">
-            <a:schemeClr val="accent1"/>
-          </a:lnRef>
-          <a:fillRef idx="0">
-            <a:schemeClr val="accent1"/>
-          </a:fillRef>
-          <a:effectRef idx="0">
-            <a:schemeClr val="accent1"/>
-          </a:effectRef>
-          <a:fontRef idx="minor">
-            <a:schemeClr val="tx1"/>
-          </a:fontRef>
-        </p:style>
-      </p:cxnSp>
-      <p:cxnSp>
-        <p:nvCxnSpPr>
-          <p:cNvPr id="22" name="Straight Connector 21"/>
-          <p:cNvCxnSpPr/>
-          <p:nvPr/>
-        </p:nvCxnSpPr>
-        <p:spPr>
-          <a:xfrm flipH="1">
-            <a:off x="8871045" y="2622645"/>
-            <a:ext cx="1351129" cy="0"/>
-          </a:xfrm>
-          <a:prstGeom prst="line">
-            <a:avLst/>
-          </a:prstGeom>
-          <a:ln w="57150">
-            <a:solidFill>
-              <a:schemeClr val="tx1">
-                <a:lumMod val="95000"/>
-              </a:schemeClr>
-            </a:solidFill>
-          </a:ln>
-        </p:spPr>
-        <p:style>
-          <a:lnRef idx="1">
-            <a:schemeClr val="accent1"/>
-          </a:lnRef>
-          <a:fillRef idx="0">
-            <a:schemeClr val="accent1"/>
-          </a:fillRef>
-          <a:effectRef idx="0">
-            <a:schemeClr val="accent1"/>
-          </a:effectRef>
-          <a:fontRef idx="minor">
-            <a:schemeClr val="tx1"/>
-          </a:fontRef>
-        </p:style>
-      </p:cxnSp>
-      <p:cxnSp>
-        <p:nvCxnSpPr>
-          <p:cNvPr id="23" name="Straight Connector 22"/>
-          <p:cNvCxnSpPr/>
-          <p:nvPr/>
-        </p:nvCxnSpPr>
-        <p:spPr>
-          <a:xfrm flipH="1">
-            <a:off x="8873319" y="3007060"/>
-            <a:ext cx="1351129" cy="0"/>
-          </a:xfrm>
-          <a:prstGeom prst="line">
-            <a:avLst/>
-          </a:prstGeom>
-          <a:ln w="57150">
-            <a:solidFill>
-              <a:schemeClr val="tx1">
-                <a:lumMod val="95000"/>
-              </a:schemeClr>
-            </a:solidFill>
-          </a:ln>
-        </p:spPr>
-        <p:style>
-          <a:lnRef idx="1">
-            <a:schemeClr val="accent1"/>
-          </a:lnRef>
-          <a:fillRef idx="0">
-            <a:schemeClr val="accent1"/>
-          </a:fillRef>
-          <a:effectRef idx="0">
-            <a:schemeClr val="accent1"/>
-          </a:effectRef>
-          <a:fontRef idx="minor">
-            <a:schemeClr val="tx1"/>
-          </a:fontRef>
-        </p:style>
-      </p:cxnSp>
-      <p:cxnSp>
-        <p:nvCxnSpPr>
-          <p:cNvPr id="24" name="Straight Connector 23"/>
-          <p:cNvCxnSpPr/>
-          <p:nvPr/>
-        </p:nvCxnSpPr>
-        <p:spPr>
-          <a:xfrm flipH="1">
-            <a:off x="8871045" y="3347814"/>
-            <a:ext cx="1351129" cy="0"/>
-          </a:xfrm>
-          <a:prstGeom prst="line">
-            <a:avLst/>
-          </a:prstGeom>
-          <a:ln w="57150">
-            <a:solidFill>
-              <a:schemeClr val="tx1">
-                <a:lumMod val="95000"/>
-              </a:schemeClr>
-            </a:solidFill>
-          </a:ln>
-        </p:spPr>
-        <p:style>
-          <a:lnRef idx="1">
-            <a:schemeClr val="accent1"/>
-          </a:lnRef>
-          <a:fillRef idx="0">
-            <a:schemeClr val="accent1"/>
-          </a:fillRef>
-          <a:effectRef idx="0">
-            <a:schemeClr val="accent1"/>
-          </a:effectRef>
-          <a:fontRef idx="minor">
-            <a:schemeClr val="tx1"/>
-          </a:fontRef>
-        </p:style>
-      </p:cxnSp>
-    </p:spTree>
-    <p:extLst>
-      <p:ext uri="{BB962C8B-B14F-4D97-AF65-F5344CB8AC3E}">
-        <p14:creationId xmlns:p14="http://schemas.microsoft.com/office/powerpoint/2010/main" val="1482854213"/>
-      </p:ext>
-    </p:extLst>
-  </p:cSld>
-  <p:clrMapOvr>
-    <a:masterClrMapping/>
-  </p:clrMapOvr>
-  <p:timing>
-    <p:tnLst>
-      <p:par>
-        <p:cTn id="1" dur="indefinite" restart="never" nodeType="tmRoot"/>
-      </p:par>
-    </p:tnLst>
-  </p:timing>
-</p:sld>
-</file>
-
-<file path=ppt/slides/slide6.xml><?xml version="1.0" encoding="utf-8"?>
-<p:sld xmlns:a="http://schemas.openxmlformats.org/drawingml/2006/main" xmlns:r="http://schemas.openxmlformats.org/officeDocument/2006/relationships" xmlns:p="http://schemas.openxmlformats.org/presentationml/2006/main" showMasterSp="0">
-  <p:cSld>
-    <p:bg>
-      <p:bgPr>
-        <a:solidFill>
-          <a:srgbClr val="272822"/>
-        </a:solidFill>
-        <a:effectLst/>
-      </p:bgPr>
-    </p:bg>
-    <p:spTree>
-      <p:nvGrpSpPr>
-        <p:cNvPr id="1" name=""/>
-        <p:cNvGrpSpPr/>
-        <p:nvPr/>
-      </p:nvGrpSpPr>
-      <p:grpSpPr>
-        <a:xfrm>
-          <a:off x="0" y="0"/>
-          <a:ext cx="0" cy="0"/>
-          <a:chOff x="0" y="0"/>
-          <a:chExt cx="0" cy="0"/>
-        </a:xfrm>
-      </p:grpSpPr>
-      <p:sp>
-        <p:nvSpPr>
-          <p:cNvPr id="4" name="Title 3"/>
-          <p:cNvSpPr>
-            <a:spLocks noGrp="1"/>
-          </p:cNvSpPr>
-          <p:nvPr>
-            <p:ph type="title"/>
-          </p:nvPr>
-        </p:nvSpPr>
-        <p:spPr>
-          <a:xfrm>
-            <a:off x="646111" y="490818"/>
-            <a:ext cx="8091489" cy="715682"/>
-          </a:xfrm>
-        </p:spPr>
-        <p:txBody>
-          <a:bodyPr/>
-          <a:lstStyle/>
-          <a:p>
-            <a:r>
-              <a:rPr lang="en-US" sz="2800" dirty="0" smtClean="0"/>
-              <a:t>Dividing the 6.144MHz clock for 3.072MHz</a:t>
-            </a:r>
-            <a:endParaRPr lang="en-US" sz="2800" dirty="0"/>
-          </a:p>
-        </p:txBody>
-      </p:sp>
-      <p:pic>
-        <p:nvPicPr>
-          <p:cNvPr id="12" name="Picture 11"/>
-          <p:cNvPicPr>
-            <a:picLocks noChangeAspect="1"/>
-          </p:cNvPicPr>
-          <p:nvPr/>
-        </p:nvPicPr>
-        <p:blipFill>
-          <a:blip r:embed="rId2"/>
-          <a:stretch>
-            <a:fillRect/>
-          </a:stretch>
-        </p:blipFill>
-        <p:spPr>
-          <a:xfrm>
-            <a:off x="2866231" y="1156202"/>
-            <a:ext cx="6916738" cy="5701798"/>
-          </a:xfrm>
-          <a:prstGeom prst="rect">
-            <a:avLst/>
-          </a:prstGeom>
-        </p:spPr>
-      </p:pic>
-    </p:spTree>
-    <p:extLst>
-      <p:ext uri="{BB962C8B-B14F-4D97-AF65-F5344CB8AC3E}">
-        <p14:creationId xmlns:p14="http://schemas.microsoft.com/office/powerpoint/2010/main" val="1957919833"/>
-      </p:ext>
-    </p:extLst>
-  </p:cSld>
-  <p:clrMapOvr>
-    <a:masterClrMapping/>
-  </p:clrMapOvr>
-  <p:timing>
-    <p:tnLst>
-      <p:par>
-        <p:cTn id="1" dur="indefinite" restart="never" nodeType="tmRoot"/>
-      </p:par>
-    </p:tnLst>
-  </p:timing>
-</p:sld>
-</file>
-
-<file path=ppt/slides/slide7.xml><?xml version="1.0" encoding="utf-8"?>
-<p:sld xmlns:a="http://schemas.openxmlformats.org/drawingml/2006/main" xmlns:r="http://schemas.openxmlformats.org/officeDocument/2006/relationships" xmlns:p="http://schemas.openxmlformats.org/presentationml/2006/main">
-  <p:cSld>
-    <p:spTree>
-      <p:nvGrpSpPr>
-        <p:cNvPr id="1" name=""/>
-        <p:cNvGrpSpPr/>
-        <p:nvPr/>
-      </p:nvGrpSpPr>
-      <p:grpSpPr>
-        <a:xfrm>
-          <a:off x="0" y="0"/>
-          <a:ext cx="0" cy="0"/>
-          <a:chOff x="0" y="0"/>
-          <a:chExt cx="0" cy="0"/>
-        </a:xfrm>
-      </p:grpSpPr>
-      <p:sp>
-        <p:nvSpPr>
           <p:cNvPr id="2" name="Title 1"/>
           <p:cNvSpPr>
             <a:spLocks noGrp="1"/>
@@ -12289,7 +11705,7 @@
 </p:sld>
 </file>
 
-<file path=ppt/slides/slide8.xml><?xml version="1.0" encoding="utf-8"?>
+<file path=ppt/slides/slide6.xml><?xml version="1.0" encoding="utf-8"?>
 <p:sld xmlns:a="http://schemas.openxmlformats.org/drawingml/2006/main" xmlns:r="http://schemas.openxmlformats.org/officeDocument/2006/relationships" xmlns:p="http://schemas.openxmlformats.org/presentationml/2006/main">
   <p:cSld>
     <p:spTree>
@@ -12357,11 +11773,7 @@
             </a:pPr>
             <a:r>
               <a:rPr lang="en-US" sz="2400" dirty="0" smtClean="0"/>
-              <a:t>Noise </a:t>
-            </a:r>
-            <a:r>
-              <a:rPr lang="en-US" sz="2400" dirty="0" smtClean="0"/>
-              <a:t>Problem:</a:t>
+              <a:t>Noise Problem:</a:t>
             </a:r>
           </a:p>
           <a:p>
@@ -12373,7 +11785,6 @@
               <a:rPr lang="en-US" sz="2000" dirty="0" smtClean="0"/>
               <a:t>Crappy mic</a:t>
             </a:r>
-            <a:endParaRPr lang="en-US" sz="2000" dirty="0" smtClean="0"/>
           </a:p>
           <a:p>
             <a:pPr marL="342900" indent="-342900" algn="l">
@@ -12396,11 +11807,7 @@
             </a:r>
             <a:r>
               <a:rPr lang="en-US" sz="2000" dirty="0" smtClean="0"/>
-              <a:t>IC </a:t>
-            </a:r>
-            <a:r>
-              <a:rPr lang="en-US" sz="2000" dirty="0" smtClean="0"/>
-              <a:t>Filter</a:t>
+              <a:t>IC Filter</a:t>
             </a:r>
           </a:p>
           <a:p>
@@ -12414,11 +11821,7 @@
             </a:r>
             <a:r>
               <a:rPr lang="en-US" sz="2000" dirty="0" smtClean="0"/>
-              <a:t> </a:t>
-            </a:r>
-            <a:r>
-              <a:rPr lang="en-US" sz="2000" dirty="0" smtClean="0"/>
-              <a:t>filter</a:t>
+              <a:t> filter</a:t>
             </a:r>
           </a:p>
           <a:p>
@@ -12750,6 +12153,1137 @@
     <p:extLst>
       <p:ext uri="{BB962C8B-B14F-4D97-AF65-F5344CB8AC3E}">
         <p14:creationId xmlns:p14="http://schemas.microsoft.com/office/powerpoint/2010/main" val="864491586"/>
+      </p:ext>
+    </p:extLst>
+  </p:cSld>
+  <p:clrMapOvr>
+    <a:masterClrMapping/>
+  </p:clrMapOvr>
+  <p:timing>
+    <p:tnLst>
+      <p:par>
+        <p:cTn id="1" dur="indefinite" restart="never" nodeType="tmRoot"/>
+      </p:par>
+    </p:tnLst>
+  </p:timing>
+</p:sld>
+</file>
+
+<file path=ppt/slides/slide7.xml><?xml version="1.0" encoding="utf-8"?>
+<p:sld xmlns:a="http://schemas.openxmlformats.org/drawingml/2006/main" xmlns:r="http://schemas.openxmlformats.org/officeDocument/2006/relationships" xmlns:p="http://schemas.openxmlformats.org/presentationml/2006/main">
+  <p:cSld>
+    <p:spTree>
+      <p:nvGrpSpPr>
+        <p:cNvPr id="1" name=""/>
+        <p:cNvGrpSpPr/>
+        <p:nvPr/>
+      </p:nvGrpSpPr>
+      <p:grpSpPr>
+        <a:xfrm>
+          <a:off x="0" y="0"/>
+          <a:ext cx="0" cy="0"/>
+          <a:chOff x="0" y="0"/>
+          <a:chExt cx="0" cy="0"/>
+        </a:xfrm>
+      </p:grpSpPr>
+      <p:cxnSp>
+        <p:nvCxnSpPr>
+          <p:cNvPr id="19" name="Straight Connector 18"/>
+          <p:cNvCxnSpPr/>
+          <p:nvPr/>
+        </p:nvCxnSpPr>
+        <p:spPr>
+          <a:xfrm flipH="1">
+            <a:off x="1105468" y="2647666"/>
+            <a:ext cx="1351129" cy="0"/>
+          </a:xfrm>
+          <a:prstGeom prst="line">
+            <a:avLst/>
+          </a:prstGeom>
+          <a:ln w="57150">
+            <a:solidFill>
+              <a:schemeClr val="tx1">
+                <a:lumMod val="95000"/>
+              </a:schemeClr>
+            </a:solidFill>
+          </a:ln>
+        </p:spPr>
+        <p:style>
+          <a:lnRef idx="1">
+            <a:schemeClr val="accent1"/>
+          </a:lnRef>
+          <a:fillRef idx="0">
+            <a:schemeClr val="accent1"/>
+          </a:fillRef>
+          <a:effectRef idx="0">
+            <a:schemeClr val="accent1"/>
+          </a:effectRef>
+          <a:fontRef idx="minor">
+            <a:schemeClr val="tx1"/>
+          </a:fontRef>
+        </p:style>
+      </p:cxnSp>
+      <p:cxnSp>
+        <p:nvCxnSpPr>
+          <p:cNvPr id="20" name="Straight Connector 19"/>
+          <p:cNvCxnSpPr/>
+          <p:nvPr/>
+        </p:nvCxnSpPr>
+        <p:spPr>
+          <a:xfrm flipH="1">
+            <a:off x="1107742" y="3032081"/>
+            <a:ext cx="1351129" cy="0"/>
+          </a:xfrm>
+          <a:prstGeom prst="line">
+            <a:avLst/>
+          </a:prstGeom>
+          <a:ln w="57150">
+            <a:solidFill>
+              <a:schemeClr val="tx1">
+                <a:lumMod val="95000"/>
+              </a:schemeClr>
+            </a:solidFill>
+          </a:ln>
+        </p:spPr>
+        <p:style>
+          <a:lnRef idx="1">
+            <a:schemeClr val="accent1"/>
+          </a:lnRef>
+          <a:fillRef idx="0">
+            <a:schemeClr val="accent1"/>
+          </a:fillRef>
+          <a:effectRef idx="0">
+            <a:schemeClr val="accent1"/>
+          </a:effectRef>
+          <a:fontRef idx="minor">
+            <a:schemeClr val="tx1"/>
+          </a:fontRef>
+        </p:style>
+      </p:cxnSp>
+      <p:cxnSp>
+        <p:nvCxnSpPr>
+          <p:cNvPr id="21" name="Straight Connector 20"/>
+          <p:cNvCxnSpPr/>
+          <p:nvPr/>
+        </p:nvCxnSpPr>
+        <p:spPr>
+          <a:xfrm flipH="1">
+            <a:off x="1105468" y="3372835"/>
+            <a:ext cx="1351129" cy="0"/>
+          </a:xfrm>
+          <a:prstGeom prst="line">
+            <a:avLst/>
+          </a:prstGeom>
+          <a:ln w="57150">
+            <a:solidFill>
+              <a:schemeClr val="tx1">
+                <a:lumMod val="95000"/>
+              </a:schemeClr>
+            </a:solidFill>
+          </a:ln>
+        </p:spPr>
+        <p:style>
+          <a:lnRef idx="1">
+            <a:schemeClr val="accent1"/>
+          </a:lnRef>
+          <a:fillRef idx="0">
+            <a:schemeClr val="accent1"/>
+          </a:fillRef>
+          <a:effectRef idx="0">
+            <a:schemeClr val="accent1"/>
+          </a:effectRef>
+          <a:fontRef idx="minor">
+            <a:schemeClr val="tx1"/>
+          </a:fontRef>
+        </p:style>
+      </p:cxnSp>
+      <p:cxnSp>
+        <p:nvCxnSpPr>
+          <p:cNvPr id="22" name="Straight Connector 21"/>
+          <p:cNvCxnSpPr/>
+          <p:nvPr/>
+        </p:nvCxnSpPr>
+        <p:spPr>
+          <a:xfrm flipH="1">
+            <a:off x="8871045" y="2622645"/>
+            <a:ext cx="1351129" cy="0"/>
+          </a:xfrm>
+          <a:prstGeom prst="line">
+            <a:avLst/>
+          </a:prstGeom>
+          <a:ln w="57150">
+            <a:solidFill>
+              <a:schemeClr val="tx1">
+                <a:lumMod val="95000"/>
+              </a:schemeClr>
+            </a:solidFill>
+          </a:ln>
+        </p:spPr>
+        <p:style>
+          <a:lnRef idx="1">
+            <a:schemeClr val="accent1"/>
+          </a:lnRef>
+          <a:fillRef idx="0">
+            <a:schemeClr val="accent1"/>
+          </a:fillRef>
+          <a:effectRef idx="0">
+            <a:schemeClr val="accent1"/>
+          </a:effectRef>
+          <a:fontRef idx="minor">
+            <a:schemeClr val="tx1"/>
+          </a:fontRef>
+        </p:style>
+      </p:cxnSp>
+      <p:cxnSp>
+        <p:nvCxnSpPr>
+          <p:cNvPr id="23" name="Straight Connector 22"/>
+          <p:cNvCxnSpPr/>
+          <p:nvPr/>
+        </p:nvCxnSpPr>
+        <p:spPr>
+          <a:xfrm flipH="1">
+            <a:off x="8873319" y="3007060"/>
+            <a:ext cx="1351129" cy="0"/>
+          </a:xfrm>
+          <a:prstGeom prst="line">
+            <a:avLst/>
+          </a:prstGeom>
+          <a:ln w="57150">
+            <a:solidFill>
+              <a:schemeClr val="tx1">
+                <a:lumMod val="95000"/>
+              </a:schemeClr>
+            </a:solidFill>
+          </a:ln>
+        </p:spPr>
+        <p:style>
+          <a:lnRef idx="1">
+            <a:schemeClr val="accent1"/>
+          </a:lnRef>
+          <a:fillRef idx="0">
+            <a:schemeClr val="accent1"/>
+          </a:fillRef>
+          <a:effectRef idx="0">
+            <a:schemeClr val="accent1"/>
+          </a:effectRef>
+          <a:fontRef idx="minor">
+            <a:schemeClr val="tx1"/>
+          </a:fontRef>
+        </p:style>
+      </p:cxnSp>
+      <p:cxnSp>
+        <p:nvCxnSpPr>
+          <p:cNvPr id="24" name="Straight Connector 23"/>
+          <p:cNvCxnSpPr/>
+          <p:nvPr/>
+        </p:nvCxnSpPr>
+        <p:spPr>
+          <a:xfrm flipH="1">
+            <a:off x="8871045" y="3347814"/>
+            <a:ext cx="1351129" cy="0"/>
+          </a:xfrm>
+          <a:prstGeom prst="line">
+            <a:avLst/>
+          </a:prstGeom>
+          <a:ln w="57150">
+            <a:solidFill>
+              <a:schemeClr val="tx1">
+                <a:lumMod val="95000"/>
+              </a:schemeClr>
+            </a:solidFill>
+          </a:ln>
+        </p:spPr>
+        <p:style>
+          <a:lnRef idx="1">
+            <a:schemeClr val="accent1"/>
+          </a:lnRef>
+          <a:fillRef idx="0">
+            <a:schemeClr val="accent1"/>
+          </a:fillRef>
+          <a:effectRef idx="0">
+            <a:schemeClr val="accent1"/>
+          </a:effectRef>
+          <a:fontRef idx="minor">
+            <a:schemeClr val="tx1"/>
+          </a:fontRef>
+        </p:style>
+      </p:cxnSp>
+      <p:sp>
+        <p:nvSpPr>
+          <p:cNvPr id="6" name="Rectangle 5"/>
+          <p:cNvSpPr/>
+          <p:nvPr/>
+        </p:nvSpPr>
+        <p:spPr>
+          <a:xfrm>
+            <a:off x="2060812" y="2156346"/>
+            <a:ext cx="7206018" cy="3998794"/>
+          </a:xfrm>
+          <a:prstGeom prst="rect">
+            <a:avLst/>
+          </a:prstGeom>
+          <a:solidFill>
+            <a:schemeClr val="bg1">
+              <a:lumMod val="75000"/>
+              <a:lumOff val="25000"/>
+            </a:schemeClr>
+          </a:solidFill>
+          <a:ln w="57150">
+            <a:solidFill>
+              <a:schemeClr val="tx1">
+                <a:lumMod val="95000"/>
+              </a:schemeClr>
+            </a:solidFill>
+          </a:ln>
+        </p:spPr>
+        <p:style>
+          <a:lnRef idx="2">
+            <a:schemeClr val="accent1">
+              <a:shade val="50000"/>
+            </a:schemeClr>
+          </a:lnRef>
+          <a:fillRef idx="1">
+            <a:schemeClr val="accent1"/>
+          </a:fillRef>
+          <a:effectRef idx="0">
+            <a:schemeClr val="accent1"/>
+          </a:effectRef>
+          <a:fontRef idx="minor">
+            <a:schemeClr val="lt1"/>
+          </a:fontRef>
+        </p:style>
+        <p:txBody>
+          <a:bodyPr rtlCol="0" anchor="ctr"/>
+          <a:lstStyle/>
+          <a:p>
+            <a:pPr algn="ctr"/>
+            <a:endParaRPr lang="en-US"/>
+          </a:p>
+        </p:txBody>
+      </p:sp>
+      <p:sp>
+        <p:nvSpPr>
+          <p:cNvPr id="2" name="Title 1"/>
+          <p:cNvSpPr>
+            <a:spLocks noGrp="1"/>
+          </p:cNvSpPr>
+          <p:nvPr>
+            <p:ph type="title"/>
+          </p:nvPr>
+        </p:nvSpPr>
+        <p:spPr/>
+        <p:txBody>
+          <a:bodyPr/>
+          <a:lstStyle/>
+          <a:p>
+            <a:r>
+              <a:rPr lang="en-US" sz="4800" dirty="0" err="1" smtClean="0"/>
+              <a:t>pdm_filter</a:t>
+            </a:r>
+            <a:r>
+              <a:rPr lang="en-US" sz="4800" dirty="0" smtClean="0"/>
+              <a:t>: main I/O</a:t>
+            </a:r>
+            <a:endParaRPr lang="en-US" sz="4800" dirty="0"/>
+          </a:p>
+        </p:txBody>
+      </p:sp>
+      <p:sp>
+        <p:nvSpPr>
+          <p:cNvPr id="7" name="TextBox 6"/>
+          <p:cNvSpPr txBox="1"/>
+          <p:nvPr/>
+        </p:nvSpPr>
+        <p:spPr>
+          <a:xfrm>
+            <a:off x="2518012" y="2462999"/>
+            <a:ext cx="846161" cy="369332"/>
+          </a:xfrm>
+          <a:prstGeom prst="rect">
+            <a:avLst/>
+          </a:prstGeom>
+          <a:noFill/>
+        </p:spPr>
+        <p:txBody>
+          <a:bodyPr wrap="square" rtlCol="0">
+            <a:spAutoFit/>
+          </a:bodyPr>
+          <a:lstStyle/>
+          <a:p>
+            <a:r>
+              <a:rPr lang="en-US" dirty="0" smtClean="0"/>
+              <a:t>.</a:t>
+            </a:r>
+            <a:r>
+              <a:rPr lang="en-US" dirty="0" err="1" smtClean="0"/>
+              <a:t>clk_i</a:t>
+            </a:r>
+            <a:endParaRPr lang="en-US" dirty="0"/>
+          </a:p>
+        </p:txBody>
+      </p:sp>
+      <p:sp>
+        <p:nvSpPr>
+          <p:cNvPr id="8" name="TextBox 7"/>
+          <p:cNvSpPr txBox="1"/>
+          <p:nvPr/>
+        </p:nvSpPr>
+        <p:spPr>
+          <a:xfrm>
+            <a:off x="2518011" y="2833175"/>
+            <a:ext cx="2006222" cy="369332"/>
+          </a:xfrm>
+          <a:prstGeom prst="rect">
+            <a:avLst/>
+          </a:prstGeom>
+          <a:noFill/>
+        </p:spPr>
+        <p:txBody>
+          <a:bodyPr wrap="square" rtlCol="0">
+            <a:spAutoFit/>
+          </a:bodyPr>
+          <a:lstStyle/>
+          <a:p>
+            <a:r>
+              <a:rPr lang="en-US" dirty="0" smtClean="0"/>
+              <a:t>.clk_6_144MHz</a:t>
+            </a:r>
+            <a:endParaRPr lang="en-US" dirty="0"/>
+          </a:p>
+        </p:txBody>
+      </p:sp>
+      <p:sp>
+        <p:nvSpPr>
+          <p:cNvPr id="9" name="TextBox 8"/>
+          <p:cNvSpPr txBox="1"/>
+          <p:nvPr/>
+        </p:nvSpPr>
+        <p:spPr>
+          <a:xfrm>
+            <a:off x="2518011" y="3135429"/>
+            <a:ext cx="2006222" cy="369332"/>
+          </a:xfrm>
+          <a:prstGeom prst="rect">
+            <a:avLst/>
+          </a:prstGeom>
+          <a:noFill/>
+        </p:spPr>
+        <p:txBody>
+          <a:bodyPr wrap="square" rtlCol="0">
+            <a:spAutoFit/>
+          </a:bodyPr>
+          <a:lstStyle/>
+          <a:p>
+            <a:r>
+              <a:rPr lang="en-US" dirty="0" smtClean="0"/>
+              <a:t>.</a:t>
+            </a:r>
+            <a:r>
+              <a:rPr lang="en-US" dirty="0" err="1" smtClean="0"/>
+              <a:t>pdm_data_i</a:t>
+            </a:r>
+            <a:endParaRPr lang="en-US" dirty="0"/>
+          </a:p>
+        </p:txBody>
+      </p:sp>
+      <p:sp>
+        <p:nvSpPr>
+          <p:cNvPr id="10" name="TextBox 9"/>
+          <p:cNvSpPr txBox="1"/>
+          <p:nvPr/>
+        </p:nvSpPr>
+        <p:spPr>
+          <a:xfrm>
+            <a:off x="6564574" y="2462999"/>
+            <a:ext cx="2156346" cy="369332"/>
+          </a:xfrm>
+          <a:prstGeom prst="rect">
+            <a:avLst/>
+          </a:prstGeom>
+          <a:noFill/>
+        </p:spPr>
+        <p:txBody>
+          <a:bodyPr wrap="square" rtlCol="0">
+            <a:spAutoFit/>
+          </a:bodyPr>
+          <a:lstStyle/>
+          <a:p>
+            <a:pPr algn="r"/>
+            <a:r>
+              <a:rPr lang="en-US" dirty="0" smtClean="0"/>
+              <a:t>.</a:t>
+            </a:r>
+            <a:r>
+              <a:rPr lang="en-US" dirty="0" err="1" smtClean="0"/>
+              <a:t>pdm_clk_o</a:t>
+            </a:r>
+            <a:endParaRPr lang="en-US" dirty="0"/>
+          </a:p>
+        </p:txBody>
+      </p:sp>
+      <p:sp>
+        <p:nvSpPr>
+          <p:cNvPr id="11" name="TextBox 10"/>
+          <p:cNvSpPr txBox="1"/>
+          <p:nvPr/>
+        </p:nvSpPr>
+        <p:spPr>
+          <a:xfrm>
+            <a:off x="6564573" y="2851117"/>
+            <a:ext cx="2156346" cy="369332"/>
+          </a:xfrm>
+          <a:prstGeom prst="rect">
+            <a:avLst/>
+          </a:prstGeom>
+          <a:noFill/>
+        </p:spPr>
+        <p:txBody>
+          <a:bodyPr wrap="square" rtlCol="0">
+            <a:spAutoFit/>
+          </a:bodyPr>
+          <a:lstStyle/>
+          <a:p>
+            <a:pPr algn="r"/>
+            <a:r>
+              <a:rPr lang="en-US" dirty="0" smtClean="0"/>
+              <a:t>.</a:t>
+            </a:r>
+            <a:r>
+              <a:rPr lang="en-US" dirty="0" err="1" smtClean="0"/>
+              <a:t>fs_o</a:t>
+            </a:r>
+            <a:endParaRPr lang="en-US" dirty="0"/>
+          </a:p>
+        </p:txBody>
+      </p:sp>
+      <p:sp>
+        <p:nvSpPr>
+          <p:cNvPr id="12" name="TextBox 11"/>
+          <p:cNvSpPr txBox="1"/>
+          <p:nvPr/>
+        </p:nvSpPr>
+        <p:spPr>
+          <a:xfrm>
+            <a:off x="6564574" y="3177216"/>
+            <a:ext cx="2156346" cy="369332"/>
+          </a:xfrm>
+          <a:prstGeom prst="rect">
+            <a:avLst/>
+          </a:prstGeom>
+          <a:noFill/>
+        </p:spPr>
+        <p:txBody>
+          <a:bodyPr wrap="square" rtlCol="0">
+            <a:spAutoFit/>
+          </a:bodyPr>
+          <a:lstStyle/>
+          <a:p>
+            <a:pPr algn="r"/>
+            <a:r>
+              <a:rPr lang="en-US" dirty="0" smtClean="0"/>
+              <a:t>.</a:t>
+            </a:r>
+            <a:r>
+              <a:rPr lang="en-US" dirty="0" err="1" smtClean="0"/>
+              <a:t>data_o</a:t>
+            </a:r>
+            <a:endParaRPr lang="en-US" dirty="0"/>
+          </a:p>
+        </p:txBody>
+      </p:sp>
+      <p:sp>
+        <p:nvSpPr>
+          <p:cNvPr id="16" name="Flowchart: Alternate Process 15"/>
+          <p:cNvSpPr/>
+          <p:nvPr/>
+        </p:nvSpPr>
+        <p:spPr>
+          <a:xfrm>
+            <a:off x="2354900" y="3879336"/>
+            <a:ext cx="1397189" cy="1296960"/>
+          </a:xfrm>
+          <a:prstGeom prst="flowChartAlternateProcess">
+            <a:avLst/>
+          </a:prstGeom>
+          <a:solidFill>
+            <a:schemeClr val="bg2">
+              <a:lumMod val="20000"/>
+              <a:lumOff val="80000"/>
+            </a:schemeClr>
+          </a:solidFill>
+          <a:ln w="38100">
+            <a:solidFill>
+              <a:schemeClr val="bg2">
+                <a:lumMod val="60000"/>
+                <a:lumOff val="40000"/>
+              </a:schemeClr>
+            </a:solidFill>
+          </a:ln>
+        </p:spPr>
+        <p:style>
+          <a:lnRef idx="2">
+            <a:schemeClr val="accent6"/>
+          </a:lnRef>
+          <a:fillRef idx="1">
+            <a:schemeClr val="lt1"/>
+          </a:fillRef>
+          <a:effectRef idx="0">
+            <a:schemeClr val="accent6"/>
+          </a:effectRef>
+          <a:fontRef idx="minor">
+            <a:schemeClr val="dk1"/>
+          </a:fontRef>
+        </p:style>
+        <p:txBody>
+          <a:bodyPr rtlCol="0" anchor="ctr"/>
+          <a:lstStyle/>
+          <a:p>
+            <a:pPr algn="ctr"/>
+            <a:endParaRPr lang="en-US">
+              <a:solidFill>
+                <a:schemeClr val="accent1">
+                  <a:lumMod val="60000"/>
+                  <a:lumOff val="40000"/>
+                </a:schemeClr>
+              </a:solidFill>
+            </a:endParaRPr>
+          </a:p>
+        </p:txBody>
+      </p:sp>
+      <p:sp>
+        <p:nvSpPr>
+          <p:cNvPr id="18" name="Flowchart: Alternate Process 17"/>
+          <p:cNvSpPr/>
+          <p:nvPr/>
+        </p:nvSpPr>
+        <p:spPr>
+          <a:xfrm>
+            <a:off x="4061219" y="3879336"/>
+            <a:ext cx="1397189" cy="1296960"/>
+          </a:xfrm>
+          <a:prstGeom prst="flowChartAlternateProcess">
+            <a:avLst/>
+          </a:prstGeom>
+          <a:solidFill>
+            <a:schemeClr val="bg2">
+              <a:lumMod val="20000"/>
+              <a:lumOff val="80000"/>
+            </a:schemeClr>
+          </a:solidFill>
+          <a:ln w="38100">
+            <a:solidFill>
+              <a:schemeClr val="bg2">
+                <a:lumMod val="60000"/>
+                <a:lumOff val="40000"/>
+              </a:schemeClr>
+            </a:solidFill>
+          </a:ln>
+        </p:spPr>
+        <p:style>
+          <a:lnRef idx="2">
+            <a:schemeClr val="accent6"/>
+          </a:lnRef>
+          <a:fillRef idx="1">
+            <a:schemeClr val="lt1"/>
+          </a:fillRef>
+          <a:effectRef idx="0">
+            <a:schemeClr val="accent6"/>
+          </a:effectRef>
+          <a:fontRef idx="minor">
+            <a:schemeClr val="dk1"/>
+          </a:fontRef>
+        </p:style>
+        <p:txBody>
+          <a:bodyPr rtlCol="0" anchor="ctr"/>
+          <a:lstStyle/>
+          <a:p>
+            <a:pPr algn="ctr"/>
+            <a:endParaRPr lang="en-US">
+              <a:solidFill>
+                <a:schemeClr val="accent1">
+                  <a:lumMod val="60000"/>
+                  <a:lumOff val="40000"/>
+                </a:schemeClr>
+              </a:solidFill>
+            </a:endParaRPr>
+          </a:p>
+        </p:txBody>
+      </p:sp>
+      <p:sp>
+        <p:nvSpPr>
+          <p:cNvPr id="25" name="Flowchart: Alternate Process 24"/>
+          <p:cNvSpPr/>
+          <p:nvPr/>
+        </p:nvSpPr>
+        <p:spPr>
+          <a:xfrm>
+            <a:off x="5767537" y="3849766"/>
+            <a:ext cx="1397189" cy="1296960"/>
+          </a:xfrm>
+          <a:prstGeom prst="flowChartAlternateProcess">
+            <a:avLst/>
+          </a:prstGeom>
+          <a:solidFill>
+            <a:schemeClr val="bg2">
+              <a:lumMod val="20000"/>
+              <a:lumOff val="80000"/>
+            </a:schemeClr>
+          </a:solidFill>
+          <a:ln w="38100">
+            <a:solidFill>
+              <a:schemeClr val="bg2">
+                <a:lumMod val="60000"/>
+                <a:lumOff val="40000"/>
+              </a:schemeClr>
+            </a:solidFill>
+          </a:ln>
+        </p:spPr>
+        <p:style>
+          <a:lnRef idx="2">
+            <a:schemeClr val="accent6"/>
+          </a:lnRef>
+          <a:fillRef idx="1">
+            <a:schemeClr val="lt1"/>
+          </a:fillRef>
+          <a:effectRef idx="0">
+            <a:schemeClr val="accent6"/>
+          </a:effectRef>
+          <a:fontRef idx="minor">
+            <a:schemeClr val="dk1"/>
+          </a:fontRef>
+        </p:style>
+        <p:txBody>
+          <a:bodyPr rtlCol="0" anchor="ctr"/>
+          <a:lstStyle/>
+          <a:p>
+            <a:pPr algn="ctr"/>
+            <a:endParaRPr lang="en-US">
+              <a:solidFill>
+                <a:schemeClr val="accent1">
+                  <a:lumMod val="60000"/>
+                  <a:lumOff val="40000"/>
+                </a:schemeClr>
+              </a:solidFill>
+            </a:endParaRPr>
+          </a:p>
+        </p:txBody>
+      </p:sp>
+      <p:sp>
+        <p:nvSpPr>
+          <p:cNvPr id="26" name="Flowchart: Alternate Process 25"/>
+          <p:cNvSpPr/>
+          <p:nvPr/>
+        </p:nvSpPr>
+        <p:spPr>
+          <a:xfrm>
+            <a:off x="7473856" y="3849766"/>
+            <a:ext cx="1397189" cy="1296960"/>
+          </a:xfrm>
+          <a:prstGeom prst="flowChartAlternateProcess">
+            <a:avLst/>
+          </a:prstGeom>
+          <a:solidFill>
+            <a:schemeClr val="bg2">
+              <a:lumMod val="20000"/>
+              <a:lumOff val="80000"/>
+            </a:schemeClr>
+          </a:solidFill>
+          <a:ln w="38100">
+            <a:solidFill>
+              <a:schemeClr val="bg2">
+                <a:lumMod val="60000"/>
+                <a:lumOff val="40000"/>
+              </a:schemeClr>
+            </a:solidFill>
+          </a:ln>
+        </p:spPr>
+        <p:style>
+          <a:lnRef idx="2">
+            <a:schemeClr val="accent6"/>
+          </a:lnRef>
+          <a:fillRef idx="1">
+            <a:schemeClr val="lt1"/>
+          </a:fillRef>
+          <a:effectRef idx="0">
+            <a:schemeClr val="accent6"/>
+          </a:effectRef>
+          <a:fontRef idx="minor">
+            <a:schemeClr val="dk1"/>
+          </a:fontRef>
+        </p:style>
+        <p:txBody>
+          <a:bodyPr rtlCol="0" anchor="ctr"/>
+          <a:lstStyle/>
+          <a:p>
+            <a:pPr algn="ctr"/>
+            <a:endParaRPr lang="en-US">
+              <a:solidFill>
+                <a:schemeClr val="accent1">
+                  <a:lumMod val="60000"/>
+                  <a:lumOff val="40000"/>
+                </a:schemeClr>
+              </a:solidFill>
+            </a:endParaRPr>
+          </a:p>
+        </p:txBody>
+      </p:sp>
+      <p:sp>
+        <p:nvSpPr>
+          <p:cNvPr id="27" name="TextBox 26"/>
+          <p:cNvSpPr txBox="1"/>
+          <p:nvPr/>
+        </p:nvSpPr>
+        <p:spPr>
+          <a:xfrm>
+            <a:off x="2354899" y="4217611"/>
+            <a:ext cx="1397189" cy="707886"/>
+          </a:xfrm>
+          <a:prstGeom prst="rect">
+            <a:avLst/>
+          </a:prstGeom>
+          <a:noFill/>
+        </p:spPr>
+        <p:txBody>
+          <a:bodyPr wrap="square" rtlCol="0">
+            <a:spAutoFit/>
+          </a:bodyPr>
+          <a:lstStyle/>
+          <a:p>
+            <a:pPr algn="ctr"/>
+            <a:r>
+              <a:rPr lang="en-US" sz="2000" dirty="0" smtClean="0">
+                <a:solidFill>
+                  <a:schemeClr val="bg2"/>
+                </a:solidFill>
+              </a:rPr>
+              <a:t>CIC</a:t>
+            </a:r>
+            <a:r>
+              <a:rPr lang="en-US" sz="2000" dirty="0" smtClean="0">
+                <a:solidFill>
+                  <a:schemeClr val="bg2"/>
+                </a:solidFill>
+              </a:rPr>
+              <a:t/>
+            </a:r>
+            <a:br>
+              <a:rPr lang="en-US" sz="2000" dirty="0" smtClean="0">
+                <a:solidFill>
+                  <a:schemeClr val="bg2"/>
+                </a:solidFill>
+              </a:rPr>
+            </a:br>
+            <a:r>
+              <a:rPr lang="en-US" sz="2000" dirty="0" smtClean="0">
+                <a:solidFill>
+                  <a:schemeClr val="bg2"/>
+                </a:solidFill>
+              </a:rPr>
+              <a:t>filter</a:t>
+            </a:r>
+            <a:endParaRPr lang="en-US" sz="2000" dirty="0">
+              <a:solidFill>
+                <a:schemeClr val="bg2"/>
+              </a:solidFill>
+            </a:endParaRPr>
+          </a:p>
+        </p:txBody>
+      </p:sp>
+      <p:sp>
+        <p:nvSpPr>
+          <p:cNvPr id="28" name="TextBox 27"/>
+          <p:cNvSpPr txBox="1"/>
+          <p:nvPr/>
+        </p:nvSpPr>
+        <p:spPr>
+          <a:xfrm>
+            <a:off x="4073819" y="4217611"/>
+            <a:ext cx="1397189" cy="707886"/>
+          </a:xfrm>
+          <a:prstGeom prst="rect">
+            <a:avLst/>
+          </a:prstGeom>
+          <a:noFill/>
+        </p:spPr>
+        <p:txBody>
+          <a:bodyPr wrap="square" rtlCol="0">
+            <a:spAutoFit/>
+          </a:bodyPr>
+          <a:lstStyle/>
+          <a:p>
+            <a:pPr algn="ctr"/>
+            <a:r>
+              <a:rPr lang="en-US" sz="2000" dirty="0" err="1" smtClean="0">
+                <a:solidFill>
+                  <a:schemeClr val="bg2"/>
+                </a:solidFill>
+              </a:rPr>
+              <a:t>half</a:t>
+            </a:r>
+            <a:r>
+              <a:rPr lang="en-US" sz="2000" dirty="0" err="1" smtClean="0">
+                <a:solidFill>
+                  <a:schemeClr val="bg2"/>
+                </a:solidFill>
+              </a:rPr>
+              <a:t>band</a:t>
+            </a:r>
+            <a:r>
+              <a:rPr lang="en-US" sz="2000" dirty="0" smtClean="0">
+                <a:solidFill>
+                  <a:schemeClr val="bg2"/>
+                </a:solidFill>
+              </a:rPr>
+              <a:t/>
+            </a:r>
+            <a:br>
+              <a:rPr lang="en-US" sz="2000" dirty="0" smtClean="0">
+                <a:solidFill>
+                  <a:schemeClr val="bg2"/>
+                </a:solidFill>
+              </a:rPr>
+            </a:br>
+            <a:r>
+              <a:rPr lang="en-US" sz="2000" dirty="0" smtClean="0">
+                <a:solidFill>
+                  <a:schemeClr val="bg2"/>
+                </a:solidFill>
+              </a:rPr>
+              <a:t>filter</a:t>
+            </a:r>
+            <a:endParaRPr lang="en-US" sz="2000" dirty="0">
+              <a:solidFill>
+                <a:schemeClr val="bg2"/>
+              </a:solidFill>
+            </a:endParaRPr>
+          </a:p>
+        </p:txBody>
+      </p:sp>
+      <p:sp>
+        <p:nvSpPr>
+          <p:cNvPr id="29" name="TextBox 28"/>
+          <p:cNvSpPr txBox="1"/>
+          <p:nvPr/>
+        </p:nvSpPr>
+        <p:spPr>
+          <a:xfrm>
+            <a:off x="5780137" y="4142958"/>
+            <a:ext cx="1397189" cy="707886"/>
+          </a:xfrm>
+          <a:prstGeom prst="rect">
+            <a:avLst/>
+          </a:prstGeom>
+          <a:noFill/>
+        </p:spPr>
+        <p:txBody>
+          <a:bodyPr wrap="square" rtlCol="0">
+            <a:spAutoFit/>
+          </a:bodyPr>
+          <a:lstStyle/>
+          <a:p>
+            <a:pPr algn="ctr"/>
+            <a:r>
+              <a:rPr lang="en-US" sz="2000" dirty="0" err="1" smtClean="0">
+                <a:solidFill>
+                  <a:schemeClr val="bg2"/>
+                </a:solidFill>
+              </a:rPr>
+              <a:t>lowpass</a:t>
+            </a:r>
+            <a:r>
+              <a:rPr lang="en-US" sz="2000" dirty="0" smtClean="0">
+                <a:solidFill>
+                  <a:schemeClr val="bg2"/>
+                </a:solidFill>
+              </a:rPr>
+              <a:t/>
+            </a:r>
+            <a:br>
+              <a:rPr lang="en-US" sz="2000" dirty="0" smtClean="0">
+                <a:solidFill>
+                  <a:schemeClr val="bg2"/>
+                </a:solidFill>
+              </a:rPr>
+            </a:br>
+            <a:r>
+              <a:rPr lang="en-US" sz="2000" dirty="0" smtClean="0">
+                <a:solidFill>
+                  <a:schemeClr val="bg2"/>
+                </a:solidFill>
+              </a:rPr>
+              <a:t>filter</a:t>
+            </a:r>
+            <a:endParaRPr lang="en-US" sz="2000" dirty="0">
+              <a:solidFill>
+                <a:schemeClr val="bg2"/>
+              </a:solidFill>
+            </a:endParaRPr>
+          </a:p>
+        </p:txBody>
+      </p:sp>
+      <p:sp>
+        <p:nvSpPr>
+          <p:cNvPr id="30" name="TextBox 29"/>
+          <p:cNvSpPr txBox="1"/>
+          <p:nvPr/>
+        </p:nvSpPr>
+        <p:spPr>
+          <a:xfrm>
+            <a:off x="7473856" y="4142958"/>
+            <a:ext cx="1397189" cy="707886"/>
+          </a:xfrm>
+          <a:prstGeom prst="rect">
+            <a:avLst/>
+          </a:prstGeom>
+          <a:noFill/>
+        </p:spPr>
+        <p:txBody>
+          <a:bodyPr wrap="square" rtlCol="0">
+            <a:spAutoFit/>
+          </a:bodyPr>
+          <a:lstStyle/>
+          <a:p>
+            <a:pPr algn="ctr"/>
+            <a:r>
+              <a:rPr lang="en-US" sz="2000" dirty="0" err="1" smtClean="0">
+                <a:solidFill>
+                  <a:schemeClr val="bg2"/>
+                </a:solidFill>
+              </a:rPr>
+              <a:t>highpass</a:t>
+            </a:r>
+            <a:r>
+              <a:rPr lang="en-US" sz="2000" dirty="0" smtClean="0">
+                <a:solidFill>
+                  <a:schemeClr val="bg2"/>
+                </a:solidFill>
+              </a:rPr>
+              <a:t/>
+            </a:r>
+            <a:br>
+              <a:rPr lang="en-US" sz="2000" dirty="0" smtClean="0">
+                <a:solidFill>
+                  <a:schemeClr val="bg2"/>
+                </a:solidFill>
+              </a:rPr>
+            </a:br>
+            <a:r>
+              <a:rPr lang="en-US" sz="2000" dirty="0" smtClean="0">
+                <a:solidFill>
+                  <a:schemeClr val="bg2"/>
+                </a:solidFill>
+              </a:rPr>
+              <a:t>filter</a:t>
+            </a:r>
+            <a:endParaRPr lang="en-US" sz="2000" dirty="0">
+              <a:solidFill>
+                <a:schemeClr val="bg2"/>
+              </a:solidFill>
+            </a:endParaRPr>
+          </a:p>
+        </p:txBody>
+      </p:sp>
+    </p:spTree>
+    <p:extLst>
+      <p:ext uri="{BB962C8B-B14F-4D97-AF65-F5344CB8AC3E}">
+        <p14:creationId xmlns:p14="http://schemas.microsoft.com/office/powerpoint/2010/main" val="1482854213"/>
+      </p:ext>
+    </p:extLst>
+  </p:cSld>
+  <p:clrMapOvr>
+    <a:masterClrMapping/>
+  </p:clrMapOvr>
+  <p:timing>
+    <p:tnLst>
+      <p:par>
+        <p:cTn id="1" dur="indefinite" restart="never" nodeType="tmRoot"/>
+      </p:par>
+    </p:tnLst>
+  </p:timing>
+</p:sld>
+</file>
+
+<file path=ppt/slides/slide8.xml><?xml version="1.0" encoding="utf-8"?>
+<p:sld xmlns:a="http://schemas.openxmlformats.org/drawingml/2006/main" xmlns:r="http://schemas.openxmlformats.org/officeDocument/2006/relationships" xmlns:p="http://schemas.openxmlformats.org/presentationml/2006/main" showMasterSp="0">
+  <p:cSld>
+    <p:bg>
+      <p:bgPr>
+        <a:solidFill>
+          <a:srgbClr val="272822"/>
+        </a:solidFill>
+        <a:effectLst/>
+      </p:bgPr>
+    </p:bg>
+    <p:spTree>
+      <p:nvGrpSpPr>
+        <p:cNvPr id="1" name=""/>
+        <p:cNvGrpSpPr/>
+        <p:nvPr/>
+      </p:nvGrpSpPr>
+      <p:grpSpPr>
+        <a:xfrm>
+          <a:off x="0" y="0"/>
+          <a:ext cx="0" cy="0"/>
+          <a:chOff x="0" y="0"/>
+          <a:chExt cx="0" cy="0"/>
+        </a:xfrm>
+      </p:grpSpPr>
+      <p:sp>
+        <p:nvSpPr>
+          <p:cNvPr id="4" name="Title 3"/>
+          <p:cNvSpPr>
+            <a:spLocks noGrp="1"/>
+          </p:cNvSpPr>
+          <p:nvPr>
+            <p:ph type="title"/>
+          </p:nvPr>
+        </p:nvSpPr>
+        <p:spPr>
+          <a:xfrm>
+            <a:off x="646111" y="490818"/>
+            <a:ext cx="8091489" cy="715682"/>
+          </a:xfrm>
+        </p:spPr>
+        <p:txBody>
+          <a:bodyPr/>
+          <a:lstStyle/>
+          <a:p>
+            <a:r>
+              <a:rPr lang="en-US" sz="2800" dirty="0" smtClean="0"/>
+              <a:t>Dividing the 6.144MHz clock for 3.072MHz</a:t>
+            </a:r>
+            <a:endParaRPr lang="en-US" sz="2800" dirty="0"/>
+          </a:p>
+        </p:txBody>
+      </p:sp>
+      <p:pic>
+        <p:nvPicPr>
+          <p:cNvPr id="12" name="Picture 11"/>
+          <p:cNvPicPr>
+            <a:picLocks noChangeAspect="1"/>
+          </p:cNvPicPr>
+          <p:nvPr/>
+        </p:nvPicPr>
+        <p:blipFill>
+          <a:blip r:embed="rId2"/>
+          <a:stretch>
+            <a:fillRect/>
+          </a:stretch>
+        </p:blipFill>
+        <p:spPr>
+          <a:xfrm>
+            <a:off x="2866231" y="1156202"/>
+            <a:ext cx="6916738" cy="5701798"/>
+          </a:xfrm>
+          <a:prstGeom prst="rect">
+            <a:avLst/>
+          </a:prstGeom>
+        </p:spPr>
+      </p:pic>
+    </p:spTree>
+    <p:extLst>
+      <p:ext uri="{BB962C8B-B14F-4D97-AF65-F5344CB8AC3E}">
+        <p14:creationId xmlns:p14="http://schemas.microsoft.com/office/powerpoint/2010/main" val="1957919833"/>
       </p:ext>
     </p:extLst>
   </p:cSld>

</xml_diff>